<commit_message>
documentation() - updated slides for SPS Twin Cities
</commit_message>
<xml_diff>
--- a/SPSTwinCities.pptx
+++ b/SPSTwinCities.pptx
@@ -9876,21 +9876,21 @@
     </dgm:pt>
   </dgm:ptLst>
   <dgm:cxnLst>
+    <dgm:cxn modelId="{186FFC5F-4B4F-4527-B87F-B4831F7220F5}" type="presOf" srcId="{D1F5E89A-6BF0-4C18-AB57-337E7CB0E380}" destId="{092B7684-72A8-477C-9957-21AC8F6812BE}" srcOrd="0" destOrd="0" presId="urn:microsoft.com/office/officeart/2005/8/layout/vList2"/>
+    <dgm:cxn modelId="{9D12970C-D0E1-4C3E-9111-E3F69C478FD6}" srcId="{CA046BC9-B7A9-4F9F-9F4B-740F2C25E25D}" destId="{53DB6E67-BF18-4A84-80ED-D4E1DB450275}" srcOrd="1" destOrd="0" parTransId="{CC0B0B86-92CA-47E9-89BE-C550DFC95AD2}" sibTransId="{C1135768-BC2D-4962-A732-82B017E975E4}"/>
+    <dgm:cxn modelId="{FB378429-8833-4FD4-A164-4E41747EC128}" srcId="{D1F5E89A-6BF0-4C18-AB57-337E7CB0E380}" destId="{C5EB2866-3BB4-4734-B3A0-1B8FE6DBBEE9}" srcOrd="1" destOrd="0" parTransId="{4EB0B830-2975-4395-81E1-725FCDBEBF30}" sibTransId="{B994EC26-8B07-4DF3-A450-E7A13EDB1584}"/>
+    <dgm:cxn modelId="{2C354D65-54C8-48A8-8764-8414228E4502}" type="presOf" srcId="{C5EB2866-3BB4-4734-B3A0-1B8FE6DBBEE9}" destId="{86033895-64FE-4A77-9B06-D42A50E5F005}" srcOrd="0" destOrd="1" presId="urn:microsoft.com/office/officeart/2005/8/layout/vList2"/>
+    <dgm:cxn modelId="{04B4383A-3FA7-40C0-8DDD-251E9CE8DBCE}" type="presOf" srcId="{53DB6E67-BF18-4A84-80ED-D4E1DB450275}" destId="{0955E407-48F9-4412-B1CE-2E66C281AA94}" srcOrd="0" destOrd="2" presId="urn:microsoft.com/office/officeart/2005/8/layout/vList2"/>
+    <dgm:cxn modelId="{A0EFAB80-2B1B-447E-99ED-8C9F67B73822}" srcId="{327D4DD0-3302-4C0F-8FC9-616F3A301F96}" destId="{D1F5E89A-6BF0-4C18-AB57-337E7CB0E380}" srcOrd="0" destOrd="0" parTransId="{23C0F16E-615B-463F-9FD3-7AB2DF773C19}" sibTransId="{4040792D-7DFA-4F09-A114-FC8CBA1A11BB}"/>
     <dgm:cxn modelId="{029C01AB-3F30-4875-A54D-3ED63A083130}" srcId="{327D4DD0-3302-4C0F-8FC9-616F3A301F96}" destId="{CA046BC9-B7A9-4F9F-9F4B-740F2C25E25D}" srcOrd="1" destOrd="0" parTransId="{09E5D50A-56CC-46A7-8488-DBA23C851F63}" sibTransId="{A2B785FB-5710-4129-9BE1-33A0BD62EF6B}"/>
-    <dgm:cxn modelId="{FB378429-8833-4FD4-A164-4E41747EC128}" srcId="{D1F5E89A-6BF0-4C18-AB57-337E7CB0E380}" destId="{C5EB2866-3BB4-4734-B3A0-1B8FE6DBBEE9}" srcOrd="1" destOrd="0" parTransId="{4EB0B830-2975-4395-81E1-725FCDBEBF30}" sibTransId="{B994EC26-8B07-4DF3-A450-E7A13EDB1584}"/>
+    <dgm:cxn modelId="{F51A6AF8-8890-46C8-8FEF-A5BBFE6C252B}" srcId="{CA046BC9-B7A9-4F9F-9F4B-740F2C25E25D}" destId="{6FE15ACF-6BA0-432B-818F-ED03A6481B44}" srcOrd="0" destOrd="0" parTransId="{F6ADACDE-0845-4AA7-B48D-E23842E1C317}" sibTransId="{C2FB7B2F-FAA7-40BE-948A-EA6DBFF613E3}"/>
     <dgm:cxn modelId="{F235EA63-1DA6-4B74-8B9D-4C4FCA9B6AB6}" type="presOf" srcId="{CA046BC9-B7A9-4F9F-9F4B-740F2C25E25D}" destId="{47BB1A43-3559-42B4-8AF4-8223C80D03A6}" srcOrd="0" destOrd="0" presId="urn:microsoft.com/office/officeart/2005/8/layout/vList2"/>
-    <dgm:cxn modelId="{186FFC5F-4B4F-4527-B87F-B4831F7220F5}" type="presOf" srcId="{D1F5E89A-6BF0-4C18-AB57-337E7CB0E380}" destId="{092B7684-72A8-477C-9957-21AC8F6812BE}" srcOrd="0" destOrd="0" presId="urn:microsoft.com/office/officeart/2005/8/layout/vList2"/>
-    <dgm:cxn modelId="{A0EFAB80-2B1B-447E-99ED-8C9F67B73822}" srcId="{327D4DD0-3302-4C0F-8FC9-616F3A301F96}" destId="{D1F5E89A-6BF0-4C18-AB57-337E7CB0E380}" srcOrd="0" destOrd="0" parTransId="{23C0F16E-615B-463F-9FD3-7AB2DF773C19}" sibTransId="{4040792D-7DFA-4F09-A114-FC8CBA1A11BB}"/>
-    <dgm:cxn modelId="{2C354D65-54C8-48A8-8764-8414228E4502}" type="presOf" srcId="{C5EB2866-3BB4-4734-B3A0-1B8FE6DBBEE9}" destId="{86033895-64FE-4A77-9B06-D42A50E5F005}" srcOrd="0" destOrd="1" presId="urn:microsoft.com/office/officeart/2005/8/layout/vList2"/>
+    <dgm:cxn modelId="{6173EB5D-ECE3-4F32-BD21-9769C34F0CFA}" type="presOf" srcId="{6FE15ACF-6BA0-432B-818F-ED03A6481B44}" destId="{0955E407-48F9-4412-B1CE-2E66C281AA94}" srcOrd="0" destOrd="0" presId="urn:microsoft.com/office/officeart/2005/8/layout/vList2"/>
+    <dgm:cxn modelId="{2ED11E3B-CB4C-48D2-8DE8-DAF0F3B7EED1}" type="presOf" srcId="{327D4DD0-3302-4C0F-8FC9-616F3A301F96}" destId="{5133B578-2648-4826-B855-99C385A2DAD2}" srcOrd="0" destOrd="0" presId="urn:microsoft.com/office/officeart/2005/8/layout/vList2"/>
+    <dgm:cxn modelId="{D1A9C282-54FC-465B-B203-E72BFF0B9C80}" srcId="{6FE15ACF-6BA0-432B-818F-ED03A6481B44}" destId="{39A62143-9F97-4C35-AE9D-384879C231CB}" srcOrd="0" destOrd="0" parTransId="{27909C89-9174-49E8-BCBA-13520F96D028}" sibTransId="{A69B530C-74CC-446D-A64B-8EF149B7F3D5}"/>
     <dgm:cxn modelId="{8A0BA071-8BB0-4092-9767-66E0A6A4E5B3}" srcId="{D1F5E89A-6BF0-4C18-AB57-337E7CB0E380}" destId="{6C3EC017-237F-4A24-8EF6-FA2D4D137F71}" srcOrd="0" destOrd="0" parTransId="{6F0D08BF-BADE-4A7A-BFBE-42911BA9E25E}" sibTransId="{B1236E78-99CE-492B-B621-C1E36850734E}"/>
+    <dgm:cxn modelId="{59A37E34-8546-407B-B8E9-68F9E7BC020D}" type="presOf" srcId="{6C3EC017-237F-4A24-8EF6-FA2D4D137F71}" destId="{86033895-64FE-4A77-9B06-D42A50E5F005}" srcOrd="0" destOrd="0" presId="urn:microsoft.com/office/officeart/2005/8/layout/vList2"/>
     <dgm:cxn modelId="{EC51FED0-0CE4-4FFA-B760-1596B9AFFB60}" type="presOf" srcId="{39A62143-9F97-4C35-AE9D-384879C231CB}" destId="{0955E407-48F9-4412-B1CE-2E66C281AA94}" srcOrd="0" destOrd="1" presId="urn:microsoft.com/office/officeart/2005/8/layout/vList2"/>
-    <dgm:cxn modelId="{F51A6AF8-8890-46C8-8FEF-A5BBFE6C252B}" srcId="{CA046BC9-B7A9-4F9F-9F4B-740F2C25E25D}" destId="{6FE15ACF-6BA0-432B-818F-ED03A6481B44}" srcOrd="0" destOrd="0" parTransId="{F6ADACDE-0845-4AA7-B48D-E23842E1C317}" sibTransId="{C2FB7B2F-FAA7-40BE-948A-EA6DBFF613E3}"/>
-    <dgm:cxn modelId="{9D12970C-D0E1-4C3E-9111-E3F69C478FD6}" srcId="{CA046BC9-B7A9-4F9F-9F4B-740F2C25E25D}" destId="{53DB6E67-BF18-4A84-80ED-D4E1DB450275}" srcOrd="1" destOrd="0" parTransId="{CC0B0B86-92CA-47E9-89BE-C550DFC95AD2}" sibTransId="{C1135768-BC2D-4962-A732-82B017E975E4}"/>
-    <dgm:cxn modelId="{04B4383A-3FA7-40C0-8DDD-251E9CE8DBCE}" type="presOf" srcId="{53DB6E67-BF18-4A84-80ED-D4E1DB450275}" destId="{0955E407-48F9-4412-B1CE-2E66C281AA94}" srcOrd="0" destOrd="2" presId="urn:microsoft.com/office/officeart/2005/8/layout/vList2"/>
-    <dgm:cxn modelId="{D1A9C282-54FC-465B-B203-E72BFF0B9C80}" srcId="{6FE15ACF-6BA0-432B-818F-ED03A6481B44}" destId="{39A62143-9F97-4C35-AE9D-384879C231CB}" srcOrd="0" destOrd="0" parTransId="{27909C89-9174-49E8-BCBA-13520F96D028}" sibTransId="{A69B530C-74CC-446D-A64B-8EF149B7F3D5}"/>
-    <dgm:cxn modelId="{2ED11E3B-CB4C-48D2-8DE8-DAF0F3B7EED1}" type="presOf" srcId="{327D4DD0-3302-4C0F-8FC9-616F3A301F96}" destId="{5133B578-2648-4826-B855-99C385A2DAD2}" srcOrd="0" destOrd="0" presId="urn:microsoft.com/office/officeart/2005/8/layout/vList2"/>
-    <dgm:cxn modelId="{6173EB5D-ECE3-4F32-BD21-9769C34F0CFA}" type="presOf" srcId="{6FE15ACF-6BA0-432B-818F-ED03A6481B44}" destId="{0955E407-48F9-4412-B1CE-2E66C281AA94}" srcOrd="0" destOrd="0" presId="urn:microsoft.com/office/officeart/2005/8/layout/vList2"/>
-    <dgm:cxn modelId="{59A37E34-8546-407B-B8E9-68F9E7BC020D}" type="presOf" srcId="{6C3EC017-237F-4A24-8EF6-FA2D4D137F71}" destId="{86033895-64FE-4A77-9B06-D42A50E5F005}" srcOrd="0" destOrd="0" presId="urn:microsoft.com/office/officeart/2005/8/layout/vList2"/>
     <dgm:cxn modelId="{1EBC1245-09A3-4EAE-9CCF-B8AB5C4A50E9}" type="presParOf" srcId="{5133B578-2648-4826-B855-99C385A2DAD2}" destId="{092B7684-72A8-477C-9957-21AC8F6812BE}" srcOrd="0" destOrd="0" presId="urn:microsoft.com/office/officeart/2005/8/layout/vList2"/>
     <dgm:cxn modelId="{24985EBC-72E6-4713-9559-005A4428306F}" type="presParOf" srcId="{5133B578-2648-4826-B855-99C385A2DAD2}" destId="{86033895-64FE-4A77-9B06-D42A50E5F005}" srcOrd="1" destOrd="0" presId="urn:microsoft.com/office/officeart/2005/8/layout/vList2"/>
     <dgm:cxn modelId="{4C437753-9A88-4A66-A730-C28090D84EFD}" type="presParOf" srcId="{5133B578-2648-4826-B855-99C385A2DAD2}" destId="{47BB1A43-3559-42B4-8AF4-8223C80D03A6}" srcOrd="2" destOrd="0" presId="urn:microsoft.com/office/officeart/2005/8/layout/vList2"/>
@@ -10239,8 +10239,8 @@
     <dgm:cxn modelId="{A706F051-3BFD-42EA-8ECB-8089C2AD5B7B}" srcId="{8520810D-844D-4902-8936-6DC19EAFFC21}" destId="{F0669842-6A00-4BEE-B774-2EA5015EE692}" srcOrd="1" destOrd="0" parTransId="{793419EE-18F9-4CA5-98C6-5DCB82007BC4}" sibTransId="{EB540874-E85D-43D7-89F5-4304243E42EF}"/>
     <dgm:cxn modelId="{52738F8A-36FF-4A05-AB41-556F4926C459}" srcId="{07E7BFEB-C90E-4250-9C20-614E3E1F5E09}" destId="{2A4ED3BA-7993-4DCB-B9D4-1A4CC2449075}" srcOrd="0" destOrd="0" parTransId="{F9651C3B-87AC-4C79-9154-70CCF59CF97C}" sibTransId="{18FB7F1C-070E-4E20-A024-EAC85EF6B441}"/>
     <dgm:cxn modelId="{DFB9B5A7-3C66-476F-83DA-D4161337752E}" srcId="{8520810D-844D-4902-8936-6DC19EAFFC21}" destId="{6089C7CF-DB3C-4DF0-AFEC-0A820D7D7FA8}" srcOrd="0" destOrd="0" parTransId="{543AE145-762B-4993-A7E4-30EEEC4B0751}" sibTransId="{9FCE72B0-A63A-453E-BF7D-BEA79B0B083F}"/>
+    <dgm:cxn modelId="{D6D09804-C71B-4BCB-A0E5-D73BDFC22AEA}" srcId="{D0E3C972-3C5E-412F-BE6D-475A1753101A}" destId="{8520810D-844D-4902-8936-6DC19EAFFC21}" srcOrd="0" destOrd="0" parTransId="{A19BFC36-04FB-4BC6-A3DA-2F24A8D22E41}" sibTransId="{4BD96689-2ED7-4FC2-900E-C02D6A84743F}"/>
     <dgm:cxn modelId="{47C3BC96-070F-4B94-887A-85E00FA18974}" srcId="{11DF7327-AFD5-426D-B891-2B8E5FD303E9}" destId="{D0E3C972-3C5E-412F-BE6D-475A1753101A}" srcOrd="1" destOrd="0" parTransId="{55E3FF37-0C0E-4FAA-9EE0-410F6FEFB0A3}" sibTransId="{238396F7-FF79-4199-B262-A35FA6CB9987}"/>
-    <dgm:cxn modelId="{D6D09804-C71B-4BCB-A0E5-D73BDFC22AEA}" srcId="{D0E3C972-3C5E-412F-BE6D-475A1753101A}" destId="{8520810D-844D-4902-8936-6DC19EAFFC21}" srcOrd="0" destOrd="0" parTransId="{A19BFC36-04FB-4BC6-A3DA-2F24A8D22E41}" sibTransId="{4BD96689-2ED7-4FC2-900E-C02D6A84743F}"/>
     <dgm:cxn modelId="{0484AA92-9DA0-4589-ACB7-E89C4050929C}" type="presParOf" srcId="{6056E2F0-B75A-4D84-8E8B-2F2B9D09A59C}" destId="{4D02DBC9-A055-4E20-8272-4315EED9D2EB}" srcOrd="0" destOrd="0" presId="urn:microsoft.com/office/officeart/2005/8/layout/vList2"/>
     <dgm:cxn modelId="{B338EBD9-6F1B-4B8D-B284-A7FA7179C292}" type="presParOf" srcId="{6056E2F0-B75A-4D84-8E8B-2F2B9D09A59C}" destId="{EBBBE11B-D235-4ACC-88E8-0635057CD13B}" srcOrd="1" destOrd="0" presId="urn:microsoft.com/office/officeart/2005/8/layout/vList2"/>
     <dgm:cxn modelId="{33E9D39A-A5EC-43EE-AF29-3860E04BBBCA}" type="presParOf" srcId="{6056E2F0-B75A-4D84-8E8B-2F2B9D09A59C}" destId="{C7CA6B79-0C26-44F0-A024-CEA74983A585}" srcOrd="2" destOrd="0" presId="urn:microsoft.com/office/officeart/2005/8/layout/vList2"/>
@@ -11408,27 +11408,27 @@
     </dgm:pt>
   </dgm:ptLst>
   <dgm:cxnLst>
+    <dgm:cxn modelId="{DB03110B-35A3-4B2D-BE5A-E9E62185D550}" srcId="{C935D3D3-CC08-46D7-BB0A-282598785710}" destId="{E681E482-3EB4-491E-B62C-851D2A2F3309}" srcOrd="1" destOrd="0" parTransId="{289D80AD-EE2C-4373-8146-A545DC3D5E1B}" sibTransId="{88065777-5FD6-4BC9-8FEE-271536EE57B0}"/>
+    <dgm:cxn modelId="{2EDD98B1-91BB-4F39-8BA7-35841414224B}" srcId="{7AB6F380-B6A6-4D9A-B0F8-291E4CCED739}" destId="{C935D3D3-CC08-46D7-BB0A-282598785710}" srcOrd="2" destOrd="0" parTransId="{7B3BFA10-5FD5-46FB-BDC0-6B1DDD1D7884}" sibTransId="{D695E790-3B58-43F1-A0E2-50F577D6DFAA}"/>
+    <dgm:cxn modelId="{8AA849EC-F27A-4BC1-BCF1-665DF64C74E3}" type="presOf" srcId="{EEDCAF25-15EA-4E78-BFE0-D54847AEC5B2}" destId="{927B5D4C-584B-44A3-8115-C904EDBC4430}" srcOrd="0" destOrd="0" presId="urn:microsoft.com/office/officeart/2005/8/layout/hList1"/>
+    <dgm:cxn modelId="{24B21965-12EF-4641-978F-1BABD7739200}" type="presOf" srcId="{483E6639-9DD5-4A95-B861-2C46E2C135B5}" destId="{B28BD30D-E2F3-4FF5-A696-E3247D35A806}" srcOrd="0" destOrd="1" presId="urn:microsoft.com/office/officeart/2005/8/layout/hList1"/>
+    <dgm:cxn modelId="{A45DA61D-0C82-4FA4-A43C-A83D697AF1FF}" srcId="{7AB6F380-B6A6-4D9A-B0F8-291E4CCED739}" destId="{3F12A8D1-E4A3-4C76-B413-84B7F0D7CC35}" srcOrd="1" destOrd="0" parTransId="{DCF1633F-D353-4F7D-BB9C-19C127AB28FD}" sibTransId="{3C76B642-6481-40D1-AB10-60E18EF1D920}"/>
+    <dgm:cxn modelId="{56498747-B747-435D-BF2B-D9A29ADD2300}" srcId="{3F12A8D1-E4A3-4C76-B413-84B7F0D7CC35}" destId="{BC8BA78D-5897-4F31-8FAB-7AECFA4C9011}" srcOrd="2" destOrd="0" parTransId="{35B777E8-82F0-4D48-918D-33BBBE876669}" sibTransId="{954D70F2-61F3-405D-8609-74232D41F948}"/>
+    <dgm:cxn modelId="{4273699C-7618-4F26-B3BB-BE14BC46D49C}" type="presOf" srcId="{C935D3D3-CC08-46D7-BB0A-282598785710}" destId="{D8D86AD1-464A-483F-AD9E-3E1CFDB2533E}" srcOrd="0" destOrd="0" presId="urn:microsoft.com/office/officeart/2005/8/layout/hList1"/>
+    <dgm:cxn modelId="{2986451A-4538-4EE4-9CD4-1B00B67CBB32}" srcId="{EEDCAF25-15EA-4E78-BFE0-D54847AEC5B2}" destId="{9B02EAB5-32C1-4D64-8396-1A8B66B61C58}" srcOrd="0" destOrd="0" parTransId="{981BE7E7-162B-4C4F-AF17-EEEE7773EF83}" sibTransId="{878199AA-F468-4BE3-93A3-0A78B18D08FC}"/>
+    <dgm:cxn modelId="{0CF7566D-4297-4A81-AFAE-5D361697E7DD}" type="presOf" srcId="{8222D628-6092-4F7A-876A-71DA314E5A62}" destId="{B28BD30D-E2F3-4FF5-A696-E3247D35A806}" srcOrd="0" destOrd="0" presId="urn:microsoft.com/office/officeart/2005/8/layout/hList1"/>
+    <dgm:cxn modelId="{FA362746-A8D6-4F0F-A3CD-488D71ABA69F}" srcId="{3F12A8D1-E4A3-4C76-B413-84B7F0D7CC35}" destId="{483E6639-9DD5-4A95-B861-2C46E2C135B5}" srcOrd="1" destOrd="0" parTransId="{44DD4EDC-99DA-4A11-854E-4C956D24FFB2}" sibTransId="{758D2B3B-7BC6-4165-AF49-B9D11CB49A9D}"/>
+    <dgm:cxn modelId="{B4920265-08B1-4B85-8994-71199D2B3BE4}" srcId="{EEDCAF25-15EA-4E78-BFE0-D54847AEC5B2}" destId="{37F7FC2E-D4A0-4858-9BD4-5E0FEE84B13C}" srcOrd="1" destOrd="0" parTransId="{B938FD04-362B-450B-BCF2-B92145B705A8}" sibTransId="{F819A351-1AC9-4ABB-BA5C-0A434A53CC84}"/>
+    <dgm:cxn modelId="{FC1A8C92-773B-4D13-BFE8-CF744FDF6979}" srcId="{7AB6F380-B6A6-4D9A-B0F8-291E4CCED739}" destId="{EEDCAF25-15EA-4E78-BFE0-D54847AEC5B2}" srcOrd="0" destOrd="0" parTransId="{36B7A9BC-6E1E-4BE7-A8D7-0F189A173587}" sibTransId="{9AA22040-4811-407B-B086-0E54478F9DB0}"/>
+    <dgm:cxn modelId="{52B7492E-E4DF-404E-B8F0-8873F6B11376}" srcId="{3F12A8D1-E4A3-4C76-B413-84B7F0D7CC35}" destId="{8222D628-6092-4F7A-876A-71DA314E5A62}" srcOrd="0" destOrd="0" parTransId="{C888EAB7-7398-4295-8BF8-97FC43BEE32F}" sibTransId="{F999558B-95F1-45AB-A8FD-075F05A1CE08}"/>
+    <dgm:cxn modelId="{50EB8C55-9673-4E32-90C7-622B9BA3CC2C}" type="presOf" srcId="{3F12A8D1-E4A3-4C76-B413-84B7F0D7CC35}" destId="{76E5C277-E6EB-41AF-B895-EF179DE32A80}" srcOrd="0" destOrd="0" presId="urn:microsoft.com/office/officeart/2005/8/layout/hList1"/>
+    <dgm:cxn modelId="{63E17E50-BE13-4FE4-B4EF-F767572A2F9C}" type="presOf" srcId="{7AB6F380-B6A6-4D9A-B0F8-291E4CCED739}" destId="{5597AEFF-EA7C-498D-B99A-5867CD78858B}" srcOrd="0" destOrd="0" presId="urn:microsoft.com/office/officeart/2005/8/layout/hList1"/>
+    <dgm:cxn modelId="{5ABCE2E4-2333-46B9-8CEB-299303520103}" type="presOf" srcId="{37F7FC2E-D4A0-4858-9BD4-5E0FEE84B13C}" destId="{40252FAC-417A-4496-81D1-036DC8CD784A}" srcOrd="0" destOrd="1" presId="urn:microsoft.com/office/officeart/2005/8/layout/hList1"/>
+    <dgm:cxn modelId="{0A6D9B6C-74FD-47D7-BE40-7B38456E1AE7}" type="presOf" srcId="{10CAEEDC-0B22-4CCF-B1D9-4F0647CFFAE3}" destId="{58F2E6ED-E6DC-425C-B1BA-1FE5C93D3CD8}" srcOrd="0" destOrd="0" presId="urn:microsoft.com/office/officeart/2005/8/layout/hList1"/>
+    <dgm:cxn modelId="{4ABCE6C6-9CCD-46C0-930D-FD0B9E87F90B}" type="presOf" srcId="{E681E482-3EB4-491E-B62C-851D2A2F3309}" destId="{58F2E6ED-E6DC-425C-B1BA-1FE5C93D3CD8}" srcOrd="0" destOrd="1" presId="urn:microsoft.com/office/officeart/2005/8/layout/hList1"/>
+    <dgm:cxn modelId="{34180288-D39F-4978-A7C1-8F02FA0BCBBA}" srcId="{C935D3D3-CC08-46D7-BB0A-282598785710}" destId="{10CAEEDC-0B22-4CCF-B1D9-4F0647CFFAE3}" srcOrd="0" destOrd="0" parTransId="{3D925141-FBD3-4F65-8391-6B8653127F47}" sibTransId="{417956AB-B4C5-403F-BE0B-1B3CF10A5A59}"/>
     <dgm:cxn modelId="{C7EC9FBB-DA46-41CC-A504-28723AE1F74A}" type="presOf" srcId="{BC8BA78D-5897-4F31-8FAB-7AECFA4C9011}" destId="{B28BD30D-E2F3-4FF5-A696-E3247D35A806}" srcOrd="0" destOrd="2" presId="urn:microsoft.com/office/officeart/2005/8/layout/hList1"/>
-    <dgm:cxn modelId="{4273699C-7618-4F26-B3BB-BE14BC46D49C}" type="presOf" srcId="{C935D3D3-CC08-46D7-BB0A-282598785710}" destId="{D8D86AD1-464A-483F-AD9E-3E1CFDB2533E}" srcOrd="0" destOrd="0" presId="urn:microsoft.com/office/officeart/2005/8/layout/hList1"/>
-    <dgm:cxn modelId="{56498747-B747-435D-BF2B-D9A29ADD2300}" srcId="{3F12A8D1-E4A3-4C76-B413-84B7F0D7CC35}" destId="{BC8BA78D-5897-4F31-8FAB-7AECFA4C9011}" srcOrd="2" destOrd="0" parTransId="{35B777E8-82F0-4D48-918D-33BBBE876669}" sibTransId="{954D70F2-61F3-405D-8609-74232D41F948}"/>
-    <dgm:cxn modelId="{4ABCE6C6-9CCD-46C0-930D-FD0B9E87F90B}" type="presOf" srcId="{E681E482-3EB4-491E-B62C-851D2A2F3309}" destId="{58F2E6ED-E6DC-425C-B1BA-1FE5C93D3CD8}" srcOrd="0" destOrd="1" presId="urn:microsoft.com/office/officeart/2005/8/layout/hList1"/>
-    <dgm:cxn modelId="{63E17E50-BE13-4FE4-B4EF-F767572A2F9C}" type="presOf" srcId="{7AB6F380-B6A6-4D9A-B0F8-291E4CCED739}" destId="{5597AEFF-EA7C-498D-B99A-5867CD78858B}" srcOrd="0" destOrd="0" presId="urn:microsoft.com/office/officeart/2005/8/layout/hList1"/>
-    <dgm:cxn modelId="{52B7492E-E4DF-404E-B8F0-8873F6B11376}" srcId="{3F12A8D1-E4A3-4C76-B413-84B7F0D7CC35}" destId="{8222D628-6092-4F7A-876A-71DA314E5A62}" srcOrd="0" destOrd="0" parTransId="{C888EAB7-7398-4295-8BF8-97FC43BEE32F}" sibTransId="{F999558B-95F1-45AB-A8FD-075F05A1CE08}"/>
-    <dgm:cxn modelId="{5ABCE2E4-2333-46B9-8CEB-299303520103}" type="presOf" srcId="{37F7FC2E-D4A0-4858-9BD4-5E0FEE84B13C}" destId="{40252FAC-417A-4496-81D1-036DC8CD784A}" srcOrd="0" destOrd="1" presId="urn:microsoft.com/office/officeart/2005/8/layout/hList1"/>
-    <dgm:cxn modelId="{FC1A8C92-773B-4D13-BFE8-CF744FDF6979}" srcId="{7AB6F380-B6A6-4D9A-B0F8-291E4CCED739}" destId="{EEDCAF25-15EA-4E78-BFE0-D54847AEC5B2}" srcOrd="0" destOrd="0" parTransId="{36B7A9BC-6E1E-4BE7-A8D7-0F189A173587}" sibTransId="{9AA22040-4811-407B-B086-0E54478F9DB0}"/>
-    <dgm:cxn modelId="{24B21965-12EF-4641-978F-1BABD7739200}" type="presOf" srcId="{483E6639-9DD5-4A95-B861-2C46E2C135B5}" destId="{B28BD30D-E2F3-4FF5-A696-E3247D35A806}" srcOrd="0" destOrd="1" presId="urn:microsoft.com/office/officeart/2005/8/layout/hList1"/>
-    <dgm:cxn modelId="{FA362746-A8D6-4F0F-A3CD-488D71ABA69F}" srcId="{3F12A8D1-E4A3-4C76-B413-84B7F0D7CC35}" destId="{483E6639-9DD5-4A95-B861-2C46E2C135B5}" srcOrd="1" destOrd="0" parTransId="{44DD4EDC-99DA-4A11-854E-4C956D24FFB2}" sibTransId="{758D2B3B-7BC6-4165-AF49-B9D11CB49A9D}"/>
-    <dgm:cxn modelId="{2EDD98B1-91BB-4F39-8BA7-35841414224B}" srcId="{7AB6F380-B6A6-4D9A-B0F8-291E4CCED739}" destId="{C935D3D3-CC08-46D7-BB0A-282598785710}" srcOrd="2" destOrd="0" parTransId="{7B3BFA10-5FD5-46FB-BDC0-6B1DDD1D7884}" sibTransId="{D695E790-3B58-43F1-A0E2-50F577D6DFAA}"/>
-    <dgm:cxn modelId="{50EB8C55-9673-4E32-90C7-622B9BA3CC2C}" type="presOf" srcId="{3F12A8D1-E4A3-4C76-B413-84B7F0D7CC35}" destId="{76E5C277-E6EB-41AF-B895-EF179DE32A80}" srcOrd="0" destOrd="0" presId="urn:microsoft.com/office/officeart/2005/8/layout/hList1"/>
-    <dgm:cxn modelId="{DB03110B-35A3-4B2D-BE5A-E9E62185D550}" srcId="{C935D3D3-CC08-46D7-BB0A-282598785710}" destId="{E681E482-3EB4-491E-B62C-851D2A2F3309}" srcOrd="1" destOrd="0" parTransId="{289D80AD-EE2C-4373-8146-A545DC3D5E1B}" sibTransId="{88065777-5FD6-4BC9-8FEE-271536EE57B0}"/>
-    <dgm:cxn modelId="{2986451A-4538-4EE4-9CD4-1B00B67CBB32}" srcId="{EEDCAF25-15EA-4E78-BFE0-D54847AEC5B2}" destId="{9B02EAB5-32C1-4D64-8396-1A8B66B61C58}" srcOrd="0" destOrd="0" parTransId="{981BE7E7-162B-4C4F-AF17-EEEE7773EF83}" sibTransId="{878199AA-F468-4BE3-93A3-0A78B18D08FC}"/>
-    <dgm:cxn modelId="{8AA849EC-F27A-4BC1-BCF1-665DF64C74E3}" type="presOf" srcId="{EEDCAF25-15EA-4E78-BFE0-D54847AEC5B2}" destId="{927B5D4C-584B-44A3-8115-C904EDBC4430}" srcOrd="0" destOrd="0" presId="urn:microsoft.com/office/officeart/2005/8/layout/hList1"/>
-    <dgm:cxn modelId="{34180288-D39F-4978-A7C1-8F02FA0BCBBA}" srcId="{C935D3D3-CC08-46D7-BB0A-282598785710}" destId="{10CAEEDC-0B22-4CCF-B1D9-4F0647CFFAE3}" srcOrd="0" destOrd="0" parTransId="{3D925141-FBD3-4F65-8391-6B8653127F47}" sibTransId="{417956AB-B4C5-403F-BE0B-1B3CF10A5A59}"/>
     <dgm:cxn modelId="{27E0C291-61E7-43C9-A75C-78B71CD91E02}" type="presOf" srcId="{9B02EAB5-32C1-4D64-8396-1A8B66B61C58}" destId="{40252FAC-417A-4496-81D1-036DC8CD784A}" srcOrd="0" destOrd="0" presId="urn:microsoft.com/office/officeart/2005/8/layout/hList1"/>
-    <dgm:cxn modelId="{A45DA61D-0C82-4FA4-A43C-A83D697AF1FF}" srcId="{7AB6F380-B6A6-4D9A-B0F8-291E4CCED739}" destId="{3F12A8D1-E4A3-4C76-B413-84B7F0D7CC35}" srcOrd="1" destOrd="0" parTransId="{DCF1633F-D353-4F7D-BB9C-19C127AB28FD}" sibTransId="{3C76B642-6481-40D1-AB10-60E18EF1D920}"/>
-    <dgm:cxn modelId="{0A6D9B6C-74FD-47D7-BE40-7B38456E1AE7}" type="presOf" srcId="{10CAEEDC-0B22-4CCF-B1D9-4F0647CFFAE3}" destId="{58F2E6ED-E6DC-425C-B1BA-1FE5C93D3CD8}" srcOrd="0" destOrd="0" presId="urn:microsoft.com/office/officeart/2005/8/layout/hList1"/>
-    <dgm:cxn modelId="{B4920265-08B1-4B85-8994-71199D2B3BE4}" srcId="{EEDCAF25-15EA-4E78-BFE0-D54847AEC5B2}" destId="{37F7FC2E-D4A0-4858-9BD4-5E0FEE84B13C}" srcOrd="1" destOrd="0" parTransId="{B938FD04-362B-450B-BCF2-B92145B705A8}" sibTransId="{F819A351-1AC9-4ABB-BA5C-0A434A53CC84}"/>
-    <dgm:cxn modelId="{0CF7566D-4297-4A81-AFAE-5D361697E7DD}" type="presOf" srcId="{8222D628-6092-4F7A-876A-71DA314E5A62}" destId="{B28BD30D-E2F3-4FF5-A696-E3247D35A806}" srcOrd="0" destOrd="0" presId="urn:microsoft.com/office/officeart/2005/8/layout/hList1"/>
     <dgm:cxn modelId="{944940F1-C256-466C-AC72-4DE4BAC139DC}" type="presParOf" srcId="{5597AEFF-EA7C-498D-B99A-5867CD78858B}" destId="{9FA5FFB5-9A31-4C7B-B727-C9C5CBB82A88}" srcOrd="0" destOrd="0" presId="urn:microsoft.com/office/officeart/2005/8/layout/hList1"/>
     <dgm:cxn modelId="{2DB31767-F694-45B9-8E99-901BC30C62A6}" type="presParOf" srcId="{9FA5FFB5-9A31-4C7B-B727-C9C5CBB82A88}" destId="{927B5D4C-584B-44A3-8115-C904EDBC4430}" srcOrd="0" destOrd="0" presId="urn:microsoft.com/office/officeart/2005/8/layout/hList1"/>
     <dgm:cxn modelId="{9BF9835C-4F03-4121-BA2F-FC23443D1B05}" type="presParOf" srcId="{9FA5FFB5-9A31-4C7B-B727-C9C5CBB82A88}" destId="{40252FAC-417A-4496-81D1-036DC8CD784A}" srcOrd="1" destOrd="0" presId="urn:microsoft.com/office/officeart/2005/8/layout/hList1"/>
@@ -13734,8 +13734,8 @@
     <dgm:cxn modelId="{6558A1F8-8F3D-46B5-8691-C2FD5705F1A5}" srcId="{BCCE90D1-CF19-429F-8B42-DA68EAA7BC59}" destId="{2B3BDFAA-0C95-4189-B7C0-F8C0B59EF0F7}" srcOrd="1" destOrd="0" parTransId="{A67E3456-BABC-435A-BC4D-0577472DA564}" sibTransId="{C94C73B8-0BCF-4732-961B-E3B560D66319}"/>
     <dgm:cxn modelId="{4BF4FFFA-50EB-476F-8BA6-98DDE060F75D}" type="presOf" srcId="{8C85D4A5-6E8E-487E-ABB0-4948D36DEB9F}" destId="{891FD0DA-C686-4503-8FB2-846B3FA28339}" srcOrd="0" destOrd="0" presId="urn:microsoft.com/office/officeart/2005/8/layout/vList2"/>
     <dgm:cxn modelId="{79C1CB4B-3E4C-49CA-A344-468DE7F685FE}" srcId="{6A272F34-4E2E-43B9-A856-EE122DA95607}" destId="{19D40E92-2720-4AFD-B5A3-A683139940F7}" srcOrd="0" destOrd="0" parTransId="{07765416-73C8-4B35-A62D-0A542D5DFCF9}" sibTransId="{D02BD052-1E7C-47B2-8F3C-82DBC2741201}"/>
+    <dgm:cxn modelId="{906C2CC3-1590-4C69-8C27-73B1C43A532E}" type="presOf" srcId="{BCCE90D1-CF19-429F-8B42-DA68EAA7BC59}" destId="{CA3AC844-2C66-4277-9E5A-7EB92D796C44}" srcOrd="0" destOrd="0" presId="urn:microsoft.com/office/officeart/2005/8/layout/vList2"/>
     <dgm:cxn modelId="{9FDC2D29-9A10-4969-A15C-618BA2062FC7}" srcId="{6A272F34-4E2E-43B9-A856-EE122DA95607}" destId="{5607F6D2-4173-430F-B289-ADA41E04394C}" srcOrd="1" destOrd="0" parTransId="{051C8356-508D-4AE8-AE73-1B4819AED9A9}" sibTransId="{53CBE20F-3B42-4FFD-A6F3-A17BB44E8891}"/>
-    <dgm:cxn modelId="{906C2CC3-1590-4C69-8C27-73B1C43A532E}" type="presOf" srcId="{BCCE90D1-CF19-429F-8B42-DA68EAA7BC59}" destId="{CA3AC844-2C66-4277-9E5A-7EB92D796C44}" srcOrd="0" destOrd="0" presId="urn:microsoft.com/office/officeart/2005/8/layout/vList2"/>
     <dgm:cxn modelId="{65E17DEC-A852-4191-946B-02F88AFFD6FA}" type="presOf" srcId="{5607F6D2-4173-430F-B289-ADA41E04394C}" destId="{4D66EC53-1CA6-413A-9F89-66CFD243F937}" srcOrd="0" destOrd="2" presId="urn:microsoft.com/office/officeart/2005/8/layout/vList2"/>
     <dgm:cxn modelId="{A3194507-A09E-46E3-B60A-492C0AE6F1BD}" type="presOf" srcId="{E2064347-3A6B-40C6-9A77-7B1E070734C6}" destId="{74122C59-1730-48D0-B438-28EBF41A5A6E}" srcOrd="0" destOrd="0" presId="urn:microsoft.com/office/officeart/2005/8/layout/vList2"/>
     <dgm:cxn modelId="{CE454F18-E4E7-4ECD-B0D8-7966C1AA13F6}" type="presOf" srcId="{2B3BDFAA-0C95-4189-B7C0-F8C0B59EF0F7}" destId="{891FD0DA-C686-4503-8FB2-846B3FA28339}" srcOrd="0" destOrd="1" presId="urn:microsoft.com/office/officeart/2005/8/layout/vList2"/>
@@ -38616,11 +38616,7 @@
             </a:r>
             <a:r>
               <a:rPr lang="en-US" smtClean="0"/>
-              <a:t>, </a:t>
-            </a:r>
-            <a:r>
-              <a:rPr lang="en-US" smtClean="0"/>
-              <a:t>2016, and </a:t>
+              <a:t>, 2016, and </a:t>
             </a:r>
             <a:r>
               <a:rPr lang="en-US" dirty="0" smtClean="0"/>
@@ -40760,7 +40756,19 @@
             </a:r>
             <a:r>
               <a:rPr lang="en-US" sz="2400" dirty="0" smtClean="0"/>
-              <a:t>Wilén, great write-up on CSR and MDS</a:t>
+              <a:t>Wilén</a:t>
+            </a:r>
+            <a:r>
+              <a:rPr lang="en-US" sz="2400" smtClean="0"/>
+              <a:t>, </a:t>
+            </a:r>
+            <a:r>
+              <a:rPr lang="en-US" sz="2400" smtClean="0"/>
+              <a:t>write-up </a:t>
+            </a:r>
+            <a:r>
+              <a:rPr lang="en-US" sz="2400" dirty="0" smtClean="0"/>
+              <a:t>on CSR and MDS</a:t>
             </a:r>
           </a:p>
           <a:p>

</xml_diff>